<commit_message>
Updated 'State unemployment.ipynb' Updated 'presentation'
</commit_message>
<xml_diff>
--- a/Presentations/Stock Market Vs Unemployment v2.pptx
+++ b/Presentations/Stock Market Vs Unemployment v2.pptx
@@ -22,9 +22,10 @@
     <p:sldId id="278" r:id="rId16"/>
     <p:sldId id="279" r:id="rId17"/>
     <p:sldId id="280" r:id="rId18"/>
-    <p:sldId id="282" r:id="rId19"/>
-    <p:sldId id="263" r:id="rId20"/>
-    <p:sldId id="267" r:id="rId21"/>
+    <p:sldId id="283" r:id="rId19"/>
+    <p:sldId id="282" r:id="rId20"/>
+    <p:sldId id="263" r:id="rId21"/>
+    <p:sldId id="267" r:id="rId22"/>
   </p:sldIdLst>
   <p:sldSz cx="12192000" cy="6858000"/>
   <p:notesSz cx="6858000" cy="9144000"/>
@@ -375,7 +376,7 @@
           <a:p>
             <a:fld id="{9184DA70-C731-4C70-880D-CCD4705E623C}" type="datetime1">
               <a:rPr lang="en-US" smtClean="0"/>
-              <a:t>12/29/20</a:t>
+              <a:t>12/30/2020</a:t>
             </a:fld>
             <a:endParaRPr lang="en-US" dirty="0"/>
           </a:p>
@@ -563,7 +564,7 @@
           <a:p>
             <a:fld id="{B612A279-0833-481D-8C56-F67FD0AC6C50}" type="datetime1">
               <a:rPr lang="en-US" smtClean="0"/>
-              <a:t>12/29/20</a:t>
+              <a:t>12/30/2020</a:t>
             </a:fld>
             <a:endParaRPr lang="en-US" dirty="0"/>
           </a:p>
@@ -805,7 +806,7 @@
           <a:p>
             <a:fld id="{6587DA83-5663-4C9C-B9AA-0B40A3DAFF81}" type="datetime1">
               <a:rPr lang="en-US" smtClean="0"/>
-              <a:t>12/29/20</a:t>
+              <a:t>12/30/2020</a:t>
             </a:fld>
             <a:endParaRPr lang="en-US" dirty="0"/>
           </a:p>
@@ -993,7 +994,7 @@
           <a:p>
             <a:fld id="{4BE1D723-8F53-4F53-90B0-1982A396982E}" type="datetime1">
               <a:rPr lang="en-US" smtClean="0"/>
-              <a:t>12/29/20</a:t>
+              <a:t>12/30/2020</a:t>
             </a:fld>
             <a:endParaRPr lang="en-US" dirty="0"/>
           </a:p>
@@ -1366,7 +1367,7 @@
           <a:p>
             <a:fld id="{97669AF7-7BEB-44E4-9852-375E34362B5B}" type="datetime1">
               <a:rPr lang="en-US" smtClean="0"/>
-              <a:t>12/29/20</a:t>
+              <a:t>12/30/2020</a:t>
             </a:fld>
             <a:endParaRPr lang="en-US" dirty="0"/>
           </a:p>
@@ -1621,7 +1622,7 @@
           <a:p>
             <a:fld id="{BAAAC38D-0552-4C82-B593-E6124DFADBE2}" type="datetime1">
               <a:rPr lang="en-US" smtClean="0"/>
-              <a:t>12/29/20</a:t>
+              <a:t>12/30/2020</a:t>
             </a:fld>
             <a:endParaRPr lang="en-US" dirty="0"/>
           </a:p>
@@ -2018,7 +2019,7 @@
           <a:p>
             <a:fld id="{D9DF0F1C-5577-4ACB-BB62-DF8F3C494C7E}" type="datetime1">
               <a:rPr lang="en-US" smtClean="0"/>
-              <a:t>12/29/20</a:t>
+              <a:t>12/30/2020</a:t>
             </a:fld>
             <a:endParaRPr lang="en-US" dirty="0"/>
           </a:p>
@@ -2154,7 +2155,7 @@
           <a:p>
             <a:fld id="{1775B394-D9F9-4F0C-B15D-605F45CB9E9F}" type="datetime1">
               <a:rPr lang="en-US" smtClean="0"/>
-              <a:t>12/29/20</a:t>
+              <a:t>12/30/2020</a:t>
             </a:fld>
             <a:endParaRPr lang="en-US" dirty="0"/>
           </a:p>
@@ -2311,7 +2312,7 @@
           <a:p>
             <a:fld id="{39667345-2558-425A-8533-9BFDBCE15005}" type="datetime1">
               <a:rPr lang="en-US" smtClean="0"/>
-              <a:t>12/29/20</a:t>
+              <a:t>12/30/2020</a:t>
             </a:fld>
             <a:endParaRPr lang="en-US" dirty="0"/>
           </a:p>
@@ -2640,7 +2641,7 @@
           <a:p>
             <a:fld id="{92BEA474-078D-4E9B-9B14-09A87B19DC46}" type="datetime1">
               <a:rPr lang="en-US" smtClean="0"/>
-              <a:t>12/29/20</a:t>
+              <a:t>12/30/2020</a:t>
             </a:fld>
             <a:endParaRPr lang="en-US" dirty="0"/>
           </a:p>
@@ -2990,7 +2991,7 @@
           <a:p>
             <a:fld id="{4907D986-8816-4272-A432-0437A28A9828}" type="datetime1">
               <a:rPr lang="en-US" smtClean="0"/>
-              <a:t>12/29/20</a:t>
+              <a:t>12/30/2020</a:t>
             </a:fld>
             <a:endParaRPr lang="en-US" dirty="0"/>
           </a:p>
@@ -3251,7 +3252,7 @@
           <a:p>
             <a:fld id="{62D6E202-B606-4609-B914-27C9371A1F6D}" type="datetime1">
               <a:rPr lang="en-US" smtClean="0"/>
-              <a:t>12/29/20</a:t>
+              <a:t>12/30/2020</a:t>
             </a:fld>
             <a:endParaRPr lang="en-US" dirty="0"/>
           </a:p>
@@ -4451,7 +4452,7 @@
         </p:nvSpPr>
         <p:spPr>
           <a:xfrm>
-            <a:off x="1106590" y="2012831"/>
+            <a:off x="1106589" y="1868038"/>
             <a:ext cx="4234917" cy="457200"/>
           </a:xfrm>
         </p:spPr>
@@ -4485,7 +4486,7 @@
         </p:nvSpPr>
         <p:spPr>
           <a:xfrm>
-            <a:off x="6320001" y="2012831"/>
+            <a:off x="6391023" y="1836386"/>
             <a:ext cx="4234917" cy="501769"/>
           </a:xfrm>
           <a:prstGeom prst="rect">
@@ -4541,7 +4542,7 @@
         </p:nvSpPr>
         <p:spPr>
           <a:xfrm>
-            <a:off x="2268809" y="5764614"/>
+            <a:off x="1951487" y="5747275"/>
             <a:ext cx="4244227" cy="369332"/>
           </a:xfrm>
           <a:prstGeom prst="rect">
@@ -4557,7 +4558,7 @@
           <a:p>
             <a:r>
               <a:rPr lang="en-US" dirty="0"/>
-              <a:t>Index Price vs. Year</a:t>
+              <a:t>Index Rate Change vs. Year</a:t>
             </a:r>
           </a:p>
         </p:txBody>
@@ -4611,8 +4612,8 @@
         </p:nvSpPr>
         <p:spPr>
           <a:xfrm>
-            <a:off x="1097280" y="741393"/>
-            <a:ext cx="9964181" cy="646331"/>
+            <a:off x="1084494" y="432763"/>
+            <a:ext cx="9964181" cy="1200329"/>
           </a:xfrm>
           <a:prstGeom prst="rect">
             <a:avLst/>
@@ -4645,11 +4646,107 @@
                 <a:ea typeface="+mj-ea"/>
                 <a:cs typeface="+mj-cs"/>
               </a:rPr>
-              <a:t>Yearly Change Breakdown</a:t>
-            </a:r>
-          </a:p>
-        </p:txBody>
-      </p:sp>
+              <a:t>Yearly Rate Change Breakdown</a:t>
+            </a:r>
+          </a:p>
+          <a:p>
+            <a:pPr algn="ctr">
+              <a:lnSpc>
+                <a:spcPct val="90000"/>
+              </a:lnSpc>
+              <a:spcBef>
+                <a:spcPct val="0"/>
+              </a:spcBef>
+            </a:pPr>
+            <a:r>
+              <a:rPr lang="en-US" sz="4000" spc="-50" dirty="0">
+                <a:solidFill>
+                  <a:schemeClr val="tx1">
+                    <a:lumMod val="75000"/>
+                    <a:lumOff val="25000"/>
+                  </a:schemeClr>
+                </a:solidFill>
+                <a:latin typeface="+mj-lt"/>
+                <a:ea typeface="+mj-ea"/>
+                <a:cs typeface="+mj-cs"/>
+              </a:rPr>
+              <a:t>(1996-2016)</a:t>
+            </a:r>
+          </a:p>
+        </p:txBody>
+      </p:sp>
+      <p:pic>
+        <p:nvPicPr>
+          <p:cNvPr id="9" name="Picture 8">
+            <a:extLst>
+              <a:ext uri="{FF2B5EF4-FFF2-40B4-BE49-F238E27FC236}">
+                <a16:creationId xmlns:a16="http://schemas.microsoft.com/office/drawing/2014/main" id="{AE81B321-F7A5-4BBD-AC5C-EBE9D2793E9F}"/>
+              </a:ext>
+            </a:extLst>
+          </p:cNvPr>
+          <p:cNvPicPr>
+            <a:picLocks noChangeAspect="1"/>
+          </p:cNvPicPr>
+          <p:nvPr/>
+        </p:nvPicPr>
+        <p:blipFill>
+          <a:blip r:embed="rId2">
+            <a:extLst>
+              <a:ext uri="{28A0092B-C50C-407E-A947-70E740481C1C}">
+                <a14:useLocalDpi xmlns:a14="http://schemas.microsoft.com/office/drawing/2010/main" val="0"/>
+              </a:ext>
+            </a:extLst>
+          </a:blip>
+          <a:stretch>
+            <a:fillRect/>
+          </a:stretch>
+        </p:blipFill>
+        <p:spPr>
+          <a:xfrm>
+            <a:off x="-315760" y="1977963"/>
+            <a:ext cx="6933460" cy="4149360"/>
+          </a:xfrm>
+          <a:prstGeom prst="rect">
+            <a:avLst/>
+          </a:prstGeom>
+        </p:spPr>
+      </p:pic>
+      <p:pic>
+        <p:nvPicPr>
+          <p:cNvPr id="13" name="Picture 12">
+            <a:extLst>
+              <a:ext uri="{FF2B5EF4-FFF2-40B4-BE49-F238E27FC236}">
+                <a16:creationId xmlns:a16="http://schemas.microsoft.com/office/drawing/2014/main" id="{A35F0DFE-4543-4CDC-B49D-11492CD06B27}"/>
+              </a:ext>
+            </a:extLst>
+          </p:cNvPr>
+          <p:cNvPicPr>
+            <a:picLocks noChangeAspect="1"/>
+          </p:cNvPicPr>
+          <p:nvPr/>
+        </p:nvPicPr>
+        <p:blipFill>
+          <a:blip r:embed="rId3">
+            <a:extLst>
+              <a:ext uri="{28A0092B-C50C-407E-A947-70E740481C1C}">
+                <a14:useLocalDpi xmlns:a14="http://schemas.microsoft.com/office/drawing/2010/main" val="0"/>
+              </a:ext>
+            </a:extLst>
+          </a:blip>
+          <a:stretch>
+            <a:fillRect/>
+          </a:stretch>
+        </p:blipFill>
+        <p:spPr>
+          <a:xfrm>
+            <a:off x="5418217" y="1977963"/>
+            <a:ext cx="6933460" cy="4160076"/>
+          </a:xfrm>
+          <a:prstGeom prst="rect">
+            <a:avLst/>
+          </a:prstGeom>
+        </p:spPr>
+      </p:pic>
     </p:spTree>
     <p:extLst>
       <p:ext uri="{BB962C8B-B14F-4D97-AF65-F5344CB8AC3E}">
@@ -4996,7 +5093,7 @@
             <a:pPr marL="944118" lvl="3" indent="-285750"/>
             <a:r>
               <a:rPr lang="en-US" dirty="0"/>
-              <a:t>Used state specific data “series”</a:t>
+              <a:t>Used state &amp; Category specific data “series”</a:t>
             </a:r>
           </a:p>
           <a:p>
@@ -5085,7 +5182,7 @@
         </p:nvSpPr>
         <p:spPr>
           <a:xfrm>
-            <a:off x="5958751" y="2108201"/>
+            <a:off x="5555556" y="1943404"/>
             <a:ext cx="1710145" cy="2120228"/>
           </a:xfrm>
           <a:prstGeom prst="rect">
@@ -5381,10 +5478,10 @@
       </p:pic>
       <p:pic>
         <p:nvPicPr>
-          <p:cNvPr id="6" name="Picture 5">
-            <a:extLst>
-              <a:ext uri="{FF2B5EF4-FFF2-40B4-BE49-F238E27FC236}">
-                <a16:creationId xmlns:a16="http://schemas.microsoft.com/office/drawing/2014/main" id="{4505B8E0-2C85-A04B-82EE-7A8EC105AF6F}"/>
+          <p:cNvPr id="10" name="Picture 9">
+            <a:extLst>
+              <a:ext uri="{FF2B5EF4-FFF2-40B4-BE49-F238E27FC236}">
+                <a16:creationId xmlns:a16="http://schemas.microsoft.com/office/drawing/2014/main" id="{9FC43C1C-C3BD-4686-BADE-55F7EE4F3642}"/>
               </a:ext>
             </a:extLst>
           </p:cNvPr>
@@ -5407,8 +5504,8 @@
         </p:blipFill>
         <p:spPr>
           <a:xfrm>
-            <a:off x="6095999" y="2581507"/>
-            <a:ext cx="4997747" cy="2265555"/>
+            <a:off x="7149800" y="1943404"/>
+            <a:ext cx="3908910" cy="4374569"/>
           </a:xfrm>
           <a:prstGeom prst="rect">
             <a:avLst/>
@@ -6365,10 +6462,10 @@
       </p:grpSpPr>
       <p:sp>
         <p:nvSpPr>
-          <p:cNvPr id="2" name="Title 1">
-            <a:extLst>
-              <a:ext uri="{FF2B5EF4-FFF2-40B4-BE49-F238E27FC236}">
-                <a16:creationId xmlns:a16="http://schemas.microsoft.com/office/drawing/2014/main" id="{2BE986B9-B3E2-40FB-8BB0-47C8146FECF3}"/>
+          <p:cNvPr id="3" name="Title 1">
+            <a:extLst>
+              <a:ext uri="{FF2B5EF4-FFF2-40B4-BE49-F238E27FC236}">
+                <a16:creationId xmlns:a16="http://schemas.microsoft.com/office/drawing/2014/main" id="{F8BB2ACD-10CF-4BBE-B803-EA531EE53CF6}"/>
               </a:ext>
             </a:extLst>
           </p:cNvPr>
@@ -6379,7 +6476,12 @@
             <p:ph type="title"/>
           </p:nvPr>
         </p:nvSpPr>
-        <p:spPr/>
+        <p:spPr>
+          <a:xfrm>
+            <a:off x="1816054" y="384993"/>
+            <a:ext cx="10058400" cy="1449387"/>
+          </a:xfrm>
+        </p:spPr>
         <p:txBody>
           <a:bodyPr/>
           <a:lstStyle/>
@@ -6396,7 +6498,7 @@
           <p:cNvPr id="4" name="TextBox 3">
             <a:extLst>
               <a:ext uri="{FF2B5EF4-FFF2-40B4-BE49-F238E27FC236}">
-                <a16:creationId xmlns:a16="http://schemas.microsoft.com/office/drawing/2014/main" id="{B5D504D4-CB1C-4B7D-936B-4AE4DE54AE15}"/>
+                <a16:creationId xmlns:a16="http://schemas.microsoft.com/office/drawing/2014/main" id="{F972AC4C-2B50-4416-8CD6-1E191E0CC462}"/>
               </a:ext>
             </a:extLst>
           </p:cNvPr>
@@ -6405,8 +6507,8 @@
         </p:nvSpPr>
         <p:spPr>
           <a:xfrm>
-            <a:off x="1097280" y="2235835"/>
-            <a:ext cx="4089550" cy="646331"/>
+            <a:off x="1029810" y="1932035"/>
+            <a:ext cx="2521258" cy="1754326"/>
           </a:xfrm>
           <a:prstGeom prst="rect">
             <a:avLst/>
@@ -6419,68 +6521,57 @@
           </a:bodyPr>
           <a:lstStyle/>
           <a:p>
-            <a:pPr lvl="1"/>
-            <a:endParaRPr lang="en-US" dirty="0"/>
-          </a:p>
-          <a:p>
             <a:pPr marL="285750" indent="-285750">
               <a:buFont typeface="Arial" panose="020B0604020202020204" pitchFamily="34" charset="0"/>
               <a:buChar char="•"/>
             </a:pPr>
-            <a:endParaRPr lang="en-US" dirty="0"/>
-          </a:p>
-        </p:txBody>
-      </p:sp>
-      <p:sp>
-        <p:nvSpPr>
-          <p:cNvPr id="7" name="TextBox 6">
-            <a:extLst>
-              <a:ext uri="{FF2B5EF4-FFF2-40B4-BE49-F238E27FC236}">
-                <a16:creationId xmlns:a16="http://schemas.microsoft.com/office/drawing/2014/main" id="{07D97BE5-B753-EF4A-B71F-AB004F7D805C}"/>
-              </a:ext>
-            </a:extLst>
-          </p:cNvPr>
-          <p:cNvSpPr txBox="1"/>
+            <a:r>
+              <a:rPr lang="en-US" dirty="0"/>
+              <a:t>Plotting Unemployment Rate Change comparison for metro areas through years (2007-2016) </a:t>
+            </a:r>
+          </a:p>
+        </p:txBody>
+      </p:sp>
+      <p:pic>
+        <p:nvPicPr>
+          <p:cNvPr id="6" name="Picture 5">
+            <a:extLst>
+              <a:ext uri="{FF2B5EF4-FFF2-40B4-BE49-F238E27FC236}">
+                <a16:creationId xmlns:a16="http://schemas.microsoft.com/office/drawing/2014/main" id="{64AA5153-2105-4EC9-BD29-64F03360C9F8}"/>
+              </a:ext>
+            </a:extLst>
+          </p:cNvPr>
+          <p:cNvPicPr>
+            <a:picLocks noChangeAspect="1"/>
+          </p:cNvPicPr>
           <p:nvPr/>
-        </p:nvSpPr>
-        <p:spPr>
-          <a:xfrm>
-            <a:off x="762743" y="2559000"/>
-            <a:ext cx="4089550" cy="1754326"/>
+        </p:nvPicPr>
+        <p:blipFill>
+          <a:blip r:embed="rId2">
+            <a:extLst>
+              <a:ext uri="{28A0092B-C50C-407E-A947-70E740481C1C}">
+                <a14:useLocalDpi xmlns:a14="http://schemas.microsoft.com/office/drawing/2010/main" val="0"/>
+              </a:ext>
+            </a:extLst>
+          </a:blip>
+          <a:stretch>
+            <a:fillRect/>
+          </a:stretch>
+        </p:blipFill>
+        <p:spPr>
+          <a:xfrm>
+            <a:off x="3794593" y="1932035"/>
+            <a:ext cx="7584775" cy="3891950"/>
           </a:xfrm>
           <a:prstGeom prst="rect">
             <a:avLst/>
           </a:prstGeom>
-          <a:noFill/>
-        </p:spPr>
-        <p:txBody>
-          <a:bodyPr wrap="square" rtlCol="0">
-            <a:spAutoFit/>
-          </a:bodyPr>
-          <a:lstStyle/>
-          <a:p>
-            <a:pPr marL="285750" indent="-285750">
-              <a:buFont typeface="Arial" panose="020B0604020202020204" pitchFamily="34" charset="0"/>
-              <a:buChar char="•"/>
-            </a:pPr>
-            <a:r>
-              <a:rPr lang="en-US" dirty="0"/>
-              <a:t>Our thoughts were that big metro-areas such as New York and California would have been more affected, but that does not seem to be the case</a:t>
-            </a:r>
-          </a:p>
-          <a:p>
-            <a:pPr marL="285750" indent="-285750">
-              <a:buFont typeface="Arial" panose="020B0604020202020204" pitchFamily="34" charset="0"/>
-              <a:buChar char="•"/>
-            </a:pPr>
-            <a:endParaRPr lang="en-US" dirty="0"/>
-          </a:p>
-        </p:txBody>
-      </p:sp>
+        </p:spPr>
+      </p:pic>
     </p:spTree>
     <p:extLst>
       <p:ext uri="{BB962C8B-B14F-4D97-AF65-F5344CB8AC3E}">
-        <p14:creationId xmlns:p14="http://schemas.microsoft.com/office/powerpoint/2010/main" val="3428690614"/>
+        <p14:creationId xmlns:p14="http://schemas.microsoft.com/office/powerpoint/2010/main" val="3489604801"/>
       </p:ext>
     </p:extLst>
   </p:cSld>
@@ -6507,12 +6598,126 @@
           <a:chExt cx="0" cy="0"/>
         </a:xfrm>
       </p:grpSpPr>
+      <p:sp>
+        <p:nvSpPr>
+          <p:cNvPr id="2" name="Title 1">
+            <a:extLst>
+              <a:ext uri="{FF2B5EF4-FFF2-40B4-BE49-F238E27FC236}">
+                <a16:creationId xmlns:a16="http://schemas.microsoft.com/office/drawing/2014/main" id="{2BE986B9-B3E2-40FB-8BB0-47C8146FECF3}"/>
+              </a:ext>
+            </a:extLst>
+          </p:cNvPr>
+          <p:cNvSpPr>
+            <a:spLocks noGrp="1"/>
+          </p:cNvSpPr>
+          <p:nvPr>
+            <p:ph type="title"/>
+          </p:nvPr>
+        </p:nvSpPr>
+        <p:spPr/>
+        <p:txBody>
+          <a:bodyPr/>
+          <a:lstStyle/>
+          <a:p>
+            <a:r>
+              <a:rPr lang="en-US" dirty="0"/>
+              <a:t>Data Analysis – State Level</a:t>
+            </a:r>
+          </a:p>
+        </p:txBody>
+      </p:sp>
+      <p:sp>
+        <p:nvSpPr>
+          <p:cNvPr id="4" name="TextBox 3">
+            <a:extLst>
+              <a:ext uri="{FF2B5EF4-FFF2-40B4-BE49-F238E27FC236}">
+                <a16:creationId xmlns:a16="http://schemas.microsoft.com/office/drawing/2014/main" id="{B5D504D4-CB1C-4B7D-936B-4AE4DE54AE15}"/>
+              </a:ext>
+            </a:extLst>
+          </p:cNvPr>
+          <p:cNvSpPr txBox="1"/>
+          <p:nvPr/>
+        </p:nvSpPr>
+        <p:spPr>
+          <a:xfrm>
+            <a:off x="1097280" y="2235835"/>
+            <a:ext cx="4089550" cy="646331"/>
+          </a:xfrm>
+          <a:prstGeom prst="rect">
+            <a:avLst/>
+          </a:prstGeom>
+          <a:noFill/>
+        </p:spPr>
+        <p:txBody>
+          <a:bodyPr wrap="square" rtlCol="0">
+            <a:spAutoFit/>
+          </a:bodyPr>
+          <a:lstStyle/>
+          <a:p>
+            <a:pPr lvl="1"/>
+            <a:endParaRPr lang="en-US" dirty="0"/>
+          </a:p>
+          <a:p>
+            <a:pPr marL="285750" indent="-285750">
+              <a:buFont typeface="Arial" panose="020B0604020202020204" pitchFamily="34" charset="0"/>
+              <a:buChar char="•"/>
+            </a:pPr>
+            <a:endParaRPr lang="en-US" dirty="0"/>
+          </a:p>
+        </p:txBody>
+      </p:sp>
+      <p:sp>
+        <p:nvSpPr>
+          <p:cNvPr id="7" name="TextBox 6">
+            <a:extLst>
+              <a:ext uri="{FF2B5EF4-FFF2-40B4-BE49-F238E27FC236}">
+                <a16:creationId xmlns:a16="http://schemas.microsoft.com/office/drawing/2014/main" id="{07D97BE5-B753-EF4A-B71F-AB004F7D805C}"/>
+              </a:ext>
+            </a:extLst>
+          </p:cNvPr>
+          <p:cNvSpPr txBox="1"/>
+          <p:nvPr/>
+        </p:nvSpPr>
+        <p:spPr>
+          <a:xfrm>
+            <a:off x="762743" y="2559000"/>
+            <a:ext cx="4089550" cy="1754326"/>
+          </a:xfrm>
+          <a:prstGeom prst="rect">
+            <a:avLst/>
+          </a:prstGeom>
+          <a:noFill/>
+        </p:spPr>
+        <p:txBody>
+          <a:bodyPr wrap="square" rtlCol="0">
+            <a:spAutoFit/>
+          </a:bodyPr>
+          <a:lstStyle/>
+          <a:p>
+            <a:pPr marL="285750" indent="-285750">
+              <a:buFont typeface="Arial" panose="020B0604020202020204" pitchFamily="34" charset="0"/>
+              <a:buChar char="•"/>
+            </a:pPr>
+            <a:r>
+              <a:rPr lang="en-US" dirty="0"/>
+              <a:t>Our thoughts were that big metro-areas such as New York and California would have been more affected, but that does not seem to be the case</a:t>
+            </a:r>
+          </a:p>
+          <a:p>
+            <a:pPr marL="285750" indent="-285750">
+              <a:buFont typeface="Arial" panose="020B0604020202020204" pitchFamily="34" charset="0"/>
+              <a:buChar char="•"/>
+            </a:pPr>
+            <a:endParaRPr lang="en-US" dirty="0"/>
+          </a:p>
+        </p:txBody>
+      </p:sp>
       <p:pic>
         <p:nvPicPr>
-          <p:cNvPr id="2" name="Picture 1">
-            <a:extLst>
-              <a:ext uri="{FF2B5EF4-FFF2-40B4-BE49-F238E27FC236}">
-                <a16:creationId xmlns:a16="http://schemas.microsoft.com/office/drawing/2014/main" id="{CA042748-FD56-8748-9753-62A6E8669595}"/>
+          <p:cNvPr id="5" name="Picture 4">
+            <a:extLst>
+              <a:ext uri="{FF2B5EF4-FFF2-40B4-BE49-F238E27FC236}">
+                <a16:creationId xmlns:a16="http://schemas.microsoft.com/office/drawing/2014/main" id="{574635A4-716C-45F3-B0A4-AE55C42DC4D2}"/>
               </a:ext>
             </a:extLst>
           </p:cNvPr>
@@ -6522,228 +6727,31 @@
           <p:nvPr/>
         </p:nvPicPr>
         <p:blipFill>
-          <a:blip r:embed="rId2"/>
+          <a:blip r:embed="rId2">
+            <a:extLst>
+              <a:ext uri="{28A0092B-C50C-407E-A947-70E740481C1C}">
+                <a14:useLocalDpi xmlns:a14="http://schemas.microsoft.com/office/drawing/2010/main" val="0"/>
+              </a:ext>
+            </a:extLst>
+          </a:blip>
           <a:stretch>
             <a:fillRect/>
           </a:stretch>
         </p:blipFill>
         <p:spPr>
           <a:xfrm>
-            <a:off x="6495069" y="308095"/>
-            <a:ext cx="3063711" cy="1580868"/>
+            <a:off x="5690527" y="1917577"/>
+            <a:ext cx="4199962" cy="4485145"/>
           </a:xfrm>
           <a:prstGeom prst="rect">
             <a:avLst/>
           </a:prstGeom>
         </p:spPr>
       </p:pic>
-      <p:sp>
-        <p:nvSpPr>
-          <p:cNvPr id="5" name="Title 4">
-            <a:extLst>
-              <a:ext uri="{FF2B5EF4-FFF2-40B4-BE49-F238E27FC236}">
-                <a16:creationId xmlns:a16="http://schemas.microsoft.com/office/drawing/2014/main" id="{06E6EEBF-99DA-48F8-BA49-F7595088A879}"/>
-              </a:ext>
-            </a:extLst>
-          </p:cNvPr>
-          <p:cNvSpPr>
-            <a:spLocks noGrp="1"/>
-          </p:cNvSpPr>
-          <p:nvPr>
-            <p:ph type="title"/>
-          </p:nvPr>
-        </p:nvSpPr>
-        <p:spPr>
-          <a:xfrm>
-            <a:off x="1066800" y="715052"/>
-            <a:ext cx="10058400" cy="973504"/>
-          </a:xfrm>
-        </p:spPr>
-        <p:txBody>
-          <a:bodyPr/>
-          <a:lstStyle/>
-          <a:p>
-            <a:r>
-              <a:rPr lang="en-US" dirty="0"/>
-              <a:t>Discussion</a:t>
-            </a:r>
-          </a:p>
-        </p:txBody>
-      </p:sp>
-      <p:sp>
-        <p:nvSpPr>
-          <p:cNvPr id="3" name="TextBox 2">
-            <a:extLst>
-              <a:ext uri="{FF2B5EF4-FFF2-40B4-BE49-F238E27FC236}">
-                <a16:creationId xmlns:a16="http://schemas.microsoft.com/office/drawing/2014/main" id="{8D658515-A231-2B44-AE67-2F32C1676B04}"/>
-              </a:ext>
-            </a:extLst>
-          </p:cNvPr>
-          <p:cNvSpPr txBox="1"/>
-          <p:nvPr/>
-        </p:nvSpPr>
-        <p:spPr>
-          <a:xfrm>
-            <a:off x="1340384" y="2025590"/>
-            <a:ext cx="9102522" cy="4247317"/>
-          </a:xfrm>
-          <a:prstGeom prst="rect">
-            <a:avLst/>
-          </a:prstGeom>
-          <a:noFill/>
-        </p:spPr>
-        <p:txBody>
-          <a:bodyPr wrap="square" rtlCol="0">
-            <a:spAutoFit/>
-          </a:bodyPr>
-          <a:lstStyle/>
-          <a:p>
-            <a:pPr marL="285750" indent="-285750">
-              <a:buFont typeface="Arial" panose="020B0604020202020204" pitchFamily="34" charset="0"/>
-              <a:buChar char="•"/>
-            </a:pPr>
-            <a:r>
-              <a:rPr lang="en-US" dirty="0"/>
-              <a:t>Findings:</a:t>
-            </a:r>
-          </a:p>
-          <a:p>
-            <a:pPr marL="742950" lvl="1" indent="-285750">
-              <a:buFont typeface="Arial" panose="020B0604020202020204" pitchFamily="34" charset="0"/>
-              <a:buChar char="•"/>
-            </a:pPr>
-            <a:r>
-              <a:rPr lang="en-US" dirty="0"/>
-              <a:t>Overall we found what we expected, but not to the degree we had thought</a:t>
-            </a:r>
-          </a:p>
-          <a:p>
-            <a:pPr marL="742950" lvl="1" indent="-285750">
-              <a:buFont typeface="Arial" panose="020B0604020202020204" pitchFamily="34" charset="0"/>
-              <a:buChar char="•"/>
-            </a:pPr>
-            <a:r>
-              <a:rPr lang="en-US" dirty="0"/>
-              <a:t>Most interesting to find the continuous increase in relationship over time</a:t>
-            </a:r>
-          </a:p>
-          <a:p>
-            <a:pPr marL="742950" lvl="1" indent="-285750">
-              <a:buFont typeface="Arial" panose="020B0604020202020204" pitchFamily="34" charset="0"/>
-              <a:buChar char="•"/>
-            </a:pPr>
-            <a:r>
-              <a:rPr lang="en-US" dirty="0"/>
-              <a:t>Found that the most affected states didn’t seem to be large metro areas</a:t>
-            </a:r>
-          </a:p>
-          <a:p>
-            <a:pPr lvl="1"/>
-            <a:endParaRPr lang="en-US" dirty="0"/>
-          </a:p>
-          <a:p>
-            <a:pPr marL="285750" indent="-285750">
-              <a:buFont typeface="Arial" panose="020B0604020202020204" pitchFamily="34" charset="0"/>
-              <a:buChar char="•"/>
-            </a:pPr>
-            <a:r>
-              <a:rPr lang="en-US" dirty="0"/>
-              <a:t>Post Mortem</a:t>
-            </a:r>
-          </a:p>
-          <a:p>
-            <a:pPr marL="742950" lvl="1" indent="-285750">
-              <a:buFont typeface="Arial" panose="020B0604020202020204" pitchFamily="34" charset="0"/>
-              <a:buChar char="•"/>
-            </a:pPr>
-            <a:r>
-              <a:rPr lang="en-US" dirty="0"/>
-              <a:t>Was Dow Jones the correct index to use?</a:t>
-            </a:r>
-          </a:p>
-          <a:p>
-            <a:pPr marL="1200150" lvl="2" indent="-285750">
-              <a:buFont typeface="Arial" panose="020B0604020202020204" pitchFamily="34" charset="0"/>
-              <a:buChar char="•"/>
-            </a:pPr>
-            <a:r>
-              <a:rPr lang="en-US" dirty="0"/>
-              <a:t>S&amp;P 500</a:t>
-            </a:r>
-          </a:p>
-          <a:p>
-            <a:pPr marL="742950" lvl="1" indent="-285750">
-              <a:buFont typeface="Arial" panose="020B0604020202020204" pitchFamily="34" charset="0"/>
-              <a:buChar char="•"/>
-            </a:pPr>
-            <a:r>
-              <a:rPr lang="en-US" dirty="0"/>
-              <a:t>Other factors that overlay?</a:t>
-            </a:r>
-          </a:p>
-          <a:p>
-            <a:pPr marL="1200150" lvl="2" indent="-285750">
-              <a:buFont typeface="Arial" panose="020B0604020202020204" pitchFamily="34" charset="0"/>
-              <a:buChar char="•"/>
-            </a:pPr>
-            <a:r>
-              <a:rPr lang="en-US" dirty="0"/>
-              <a:t>GDP</a:t>
-            </a:r>
-          </a:p>
-          <a:p>
-            <a:pPr marL="1200150" lvl="2" indent="-285750">
-              <a:buFont typeface="Arial" panose="020B0604020202020204" pitchFamily="34" charset="0"/>
-              <a:buChar char="•"/>
-            </a:pPr>
-            <a:r>
-              <a:rPr lang="en-US" dirty="0"/>
-              <a:t>Inflation</a:t>
-            </a:r>
-          </a:p>
-          <a:p>
-            <a:pPr marL="742950" lvl="1" indent="-285750">
-              <a:buFont typeface="Arial" panose="020B0604020202020204" pitchFamily="34" charset="0"/>
-              <a:buChar char="•"/>
-            </a:pPr>
-            <a:r>
-              <a:rPr lang="en-US" dirty="0"/>
-              <a:t>How much do external events affect the Dow/Unemployment?</a:t>
-            </a:r>
-          </a:p>
-          <a:p>
-            <a:pPr marL="742950" lvl="1" indent="-285750">
-              <a:buFont typeface="Arial" panose="020B0604020202020204" pitchFamily="34" charset="0"/>
-              <a:buChar char="•"/>
-            </a:pPr>
-            <a:r>
-              <a:rPr lang="en-US" dirty="0"/>
-              <a:t>Were certain industries affected more than others? Could that skew State data?</a:t>
-            </a:r>
-          </a:p>
-          <a:p>
-            <a:pPr marL="742950" lvl="1" indent="-285750">
-              <a:buFont typeface="Arial" panose="020B0604020202020204" pitchFamily="34" charset="0"/>
-              <a:buChar char="•"/>
-            </a:pPr>
-            <a:r>
-              <a:rPr lang="en-US" dirty="0"/>
-              <a:t>2020 Analysis – Would Covid-19 scenario go against previous years?</a:t>
-            </a:r>
-          </a:p>
-          <a:p>
-            <a:pPr marL="742950" lvl="1" indent="-285750">
-              <a:buFont typeface="Arial" panose="020B0604020202020204" pitchFamily="34" charset="0"/>
-              <a:buChar char="•"/>
-            </a:pPr>
-            <a:endParaRPr lang="en-US" dirty="0"/>
-          </a:p>
-        </p:txBody>
-      </p:sp>
     </p:spTree>
     <p:extLst>
       <p:ext uri="{BB962C8B-B14F-4D97-AF65-F5344CB8AC3E}">
-        <p14:creationId xmlns:p14="http://schemas.microsoft.com/office/powerpoint/2010/main" val="3399840146"/>
+        <p14:creationId xmlns:p14="http://schemas.microsoft.com/office/powerpoint/2010/main" val="3428690614"/>
       </p:ext>
     </p:extLst>
   </p:cSld>
@@ -6921,6 +6929,269 @@
 </file>
 
 <file path=ppt/slides/slide20.xml><?xml version="1.0" encoding="utf-8"?>
+<p:sld xmlns:a="http://schemas.openxmlformats.org/drawingml/2006/main" xmlns:r="http://schemas.openxmlformats.org/officeDocument/2006/relationships" xmlns:p="http://schemas.openxmlformats.org/presentationml/2006/main">
+  <p:cSld>
+    <p:spTree>
+      <p:nvGrpSpPr>
+        <p:cNvPr id="1" name=""/>
+        <p:cNvGrpSpPr/>
+        <p:nvPr/>
+      </p:nvGrpSpPr>
+      <p:grpSpPr>
+        <a:xfrm>
+          <a:off x="0" y="0"/>
+          <a:ext cx="0" cy="0"/>
+          <a:chOff x="0" y="0"/>
+          <a:chExt cx="0" cy="0"/>
+        </a:xfrm>
+      </p:grpSpPr>
+      <p:pic>
+        <p:nvPicPr>
+          <p:cNvPr id="2" name="Picture 1">
+            <a:extLst>
+              <a:ext uri="{FF2B5EF4-FFF2-40B4-BE49-F238E27FC236}">
+                <a16:creationId xmlns:a16="http://schemas.microsoft.com/office/drawing/2014/main" id="{CA042748-FD56-8748-9753-62A6E8669595}"/>
+              </a:ext>
+            </a:extLst>
+          </p:cNvPr>
+          <p:cNvPicPr>
+            <a:picLocks noChangeAspect="1"/>
+          </p:cNvPicPr>
+          <p:nvPr/>
+        </p:nvPicPr>
+        <p:blipFill>
+          <a:blip r:embed="rId2"/>
+          <a:stretch>
+            <a:fillRect/>
+          </a:stretch>
+        </p:blipFill>
+        <p:spPr>
+          <a:xfrm>
+            <a:off x="6495069" y="308095"/>
+            <a:ext cx="3063711" cy="1580868"/>
+          </a:xfrm>
+          <a:prstGeom prst="rect">
+            <a:avLst/>
+          </a:prstGeom>
+        </p:spPr>
+      </p:pic>
+      <p:sp>
+        <p:nvSpPr>
+          <p:cNvPr id="5" name="Title 4">
+            <a:extLst>
+              <a:ext uri="{FF2B5EF4-FFF2-40B4-BE49-F238E27FC236}">
+                <a16:creationId xmlns:a16="http://schemas.microsoft.com/office/drawing/2014/main" id="{06E6EEBF-99DA-48F8-BA49-F7595088A879}"/>
+              </a:ext>
+            </a:extLst>
+          </p:cNvPr>
+          <p:cNvSpPr>
+            <a:spLocks noGrp="1"/>
+          </p:cNvSpPr>
+          <p:nvPr>
+            <p:ph type="title"/>
+          </p:nvPr>
+        </p:nvSpPr>
+        <p:spPr>
+          <a:xfrm>
+            <a:off x="1066800" y="715052"/>
+            <a:ext cx="10058400" cy="973504"/>
+          </a:xfrm>
+        </p:spPr>
+        <p:txBody>
+          <a:bodyPr/>
+          <a:lstStyle/>
+          <a:p>
+            <a:r>
+              <a:rPr lang="en-US" dirty="0"/>
+              <a:t>Discussion</a:t>
+            </a:r>
+          </a:p>
+        </p:txBody>
+      </p:sp>
+      <p:sp>
+        <p:nvSpPr>
+          <p:cNvPr id="3" name="TextBox 2">
+            <a:extLst>
+              <a:ext uri="{FF2B5EF4-FFF2-40B4-BE49-F238E27FC236}">
+                <a16:creationId xmlns:a16="http://schemas.microsoft.com/office/drawing/2014/main" id="{8D658515-A231-2B44-AE67-2F32C1676B04}"/>
+              </a:ext>
+            </a:extLst>
+          </p:cNvPr>
+          <p:cNvSpPr txBox="1"/>
+          <p:nvPr/>
+        </p:nvSpPr>
+        <p:spPr>
+          <a:xfrm>
+            <a:off x="1340384" y="2025590"/>
+            <a:ext cx="9102522" cy="4247317"/>
+          </a:xfrm>
+          <a:prstGeom prst="rect">
+            <a:avLst/>
+          </a:prstGeom>
+          <a:noFill/>
+        </p:spPr>
+        <p:txBody>
+          <a:bodyPr wrap="square" rtlCol="0">
+            <a:spAutoFit/>
+          </a:bodyPr>
+          <a:lstStyle/>
+          <a:p>
+            <a:pPr marL="285750" indent="-285750">
+              <a:buFont typeface="Arial" panose="020B0604020202020204" pitchFamily="34" charset="0"/>
+              <a:buChar char="•"/>
+            </a:pPr>
+            <a:r>
+              <a:rPr lang="en-US" dirty="0"/>
+              <a:t>Findings:</a:t>
+            </a:r>
+          </a:p>
+          <a:p>
+            <a:pPr marL="742950" lvl="1" indent="-285750">
+              <a:buFont typeface="Arial" panose="020B0604020202020204" pitchFamily="34" charset="0"/>
+              <a:buChar char="•"/>
+            </a:pPr>
+            <a:r>
+              <a:rPr lang="en-US" dirty="0"/>
+              <a:t>Overall we found what we expected, but not to the degree we had thought</a:t>
+            </a:r>
+          </a:p>
+          <a:p>
+            <a:pPr marL="742950" lvl="1" indent="-285750">
+              <a:buFont typeface="Arial" panose="020B0604020202020204" pitchFamily="34" charset="0"/>
+              <a:buChar char="•"/>
+            </a:pPr>
+            <a:r>
+              <a:rPr lang="en-US" dirty="0"/>
+              <a:t>Most interesting to find the continuous increase in relationship over time</a:t>
+            </a:r>
+          </a:p>
+          <a:p>
+            <a:pPr marL="742950" lvl="1" indent="-285750">
+              <a:buFont typeface="Arial" panose="020B0604020202020204" pitchFamily="34" charset="0"/>
+              <a:buChar char="•"/>
+            </a:pPr>
+            <a:r>
+              <a:rPr lang="en-US" dirty="0"/>
+              <a:t>Found that the most affected states didn’t seem to be large metro areas</a:t>
+            </a:r>
+          </a:p>
+          <a:p>
+            <a:pPr lvl="1"/>
+            <a:endParaRPr lang="en-US" dirty="0"/>
+          </a:p>
+          <a:p>
+            <a:pPr marL="285750" indent="-285750">
+              <a:buFont typeface="Arial" panose="020B0604020202020204" pitchFamily="34" charset="0"/>
+              <a:buChar char="•"/>
+            </a:pPr>
+            <a:r>
+              <a:rPr lang="en-US" dirty="0"/>
+              <a:t>Post Mortem</a:t>
+            </a:r>
+          </a:p>
+          <a:p>
+            <a:pPr marL="742950" lvl="1" indent="-285750">
+              <a:buFont typeface="Arial" panose="020B0604020202020204" pitchFamily="34" charset="0"/>
+              <a:buChar char="•"/>
+            </a:pPr>
+            <a:r>
+              <a:rPr lang="en-US" dirty="0"/>
+              <a:t>Was Dow Jones the correct index to use?</a:t>
+            </a:r>
+          </a:p>
+          <a:p>
+            <a:pPr marL="1200150" lvl="2" indent="-285750">
+              <a:buFont typeface="Arial" panose="020B0604020202020204" pitchFamily="34" charset="0"/>
+              <a:buChar char="•"/>
+            </a:pPr>
+            <a:r>
+              <a:rPr lang="en-US" dirty="0"/>
+              <a:t>S&amp;P 500</a:t>
+            </a:r>
+          </a:p>
+          <a:p>
+            <a:pPr marL="742950" lvl="1" indent="-285750">
+              <a:buFont typeface="Arial" panose="020B0604020202020204" pitchFamily="34" charset="0"/>
+              <a:buChar char="•"/>
+            </a:pPr>
+            <a:r>
+              <a:rPr lang="en-US" dirty="0"/>
+              <a:t>Other factors that overlay?</a:t>
+            </a:r>
+          </a:p>
+          <a:p>
+            <a:pPr marL="1200150" lvl="2" indent="-285750">
+              <a:buFont typeface="Arial" panose="020B0604020202020204" pitchFamily="34" charset="0"/>
+              <a:buChar char="•"/>
+            </a:pPr>
+            <a:r>
+              <a:rPr lang="en-US" dirty="0"/>
+              <a:t>GDP</a:t>
+            </a:r>
+          </a:p>
+          <a:p>
+            <a:pPr marL="1200150" lvl="2" indent="-285750">
+              <a:buFont typeface="Arial" panose="020B0604020202020204" pitchFamily="34" charset="0"/>
+              <a:buChar char="•"/>
+            </a:pPr>
+            <a:r>
+              <a:rPr lang="en-US" dirty="0"/>
+              <a:t>Inflation</a:t>
+            </a:r>
+          </a:p>
+          <a:p>
+            <a:pPr marL="742950" lvl="1" indent="-285750">
+              <a:buFont typeface="Arial" panose="020B0604020202020204" pitchFamily="34" charset="0"/>
+              <a:buChar char="•"/>
+            </a:pPr>
+            <a:r>
+              <a:rPr lang="en-US" dirty="0"/>
+              <a:t>How much do external events affect the Dow/Unemployment?</a:t>
+            </a:r>
+          </a:p>
+          <a:p>
+            <a:pPr marL="742950" lvl="1" indent="-285750">
+              <a:buFont typeface="Arial" panose="020B0604020202020204" pitchFamily="34" charset="0"/>
+              <a:buChar char="•"/>
+            </a:pPr>
+            <a:r>
+              <a:rPr lang="en-US" dirty="0"/>
+              <a:t>Were certain industries affected more than others? Could that skew State data?</a:t>
+            </a:r>
+          </a:p>
+          <a:p>
+            <a:pPr marL="742950" lvl="1" indent="-285750">
+              <a:buFont typeface="Arial" panose="020B0604020202020204" pitchFamily="34" charset="0"/>
+              <a:buChar char="•"/>
+            </a:pPr>
+            <a:r>
+              <a:rPr lang="en-US" dirty="0"/>
+              <a:t>2020 Analysis – Would Covid-19 scenario go against previous years?</a:t>
+            </a:r>
+          </a:p>
+          <a:p>
+            <a:pPr marL="742950" lvl="1" indent="-285750">
+              <a:buFont typeface="Arial" panose="020B0604020202020204" pitchFamily="34" charset="0"/>
+              <a:buChar char="•"/>
+            </a:pPr>
+            <a:endParaRPr lang="en-US" dirty="0"/>
+          </a:p>
+        </p:txBody>
+      </p:sp>
+    </p:spTree>
+    <p:extLst>
+      <p:ext uri="{BB962C8B-B14F-4D97-AF65-F5344CB8AC3E}">
+        <p14:creationId xmlns:p14="http://schemas.microsoft.com/office/powerpoint/2010/main" val="3399840146"/>
+      </p:ext>
+    </p:extLst>
+  </p:cSld>
+  <p:clrMapOvr>
+    <a:masterClrMapping/>
+  </p:clrMapOvr>
+</p:sld>
+</file>
+
+<file path=ppt/slides/slide21.xml><?xml version="1.0" encoding="utf-8"?>
 <p:sld xmlns:a="http://schemas.openxmlformats.org/drawingml/2006/main" xmlns:r="http://schemas.openxmlformats.org/officeDocument/2006/relationships" xmlns:p="http://schemas.openxmlformats.org/presentationml/2006/main">
   <p:cSld>
     <p:spTree>

</xml_diff>